<commit_message>
lecture 7 numeration fixed
</commit_message>
<xml_diff>
--- a/pt1/lectures/lecture7/lecture7.pptx
+++ b/pt1/lectures/lecture7/lecture7.pptx
@@ -205,7 +205,7 @@
           <a:p>
             <a:fld id="{500343A3-339E-4D16-B233-10D6E8599600}" type="datetimeFigureOut">
               <a:rPr lang="en-US" smtClean="0"/>
-              <a:t>5/19/2022</a:t>
+              <a:t>9/12/2022</a:t>
             </a:fld>
             <a:endParaRPr lang="en-US"/>
           </a:p>
@@ -1362,7 +1362,7 @@
           <a:p>
             <a:fld id="{66C7D333-9F60-49D1-8F75-20D2324FF5CF}" type="datetimeFigureOut">
               <a:rPr lang="en-US" smtClean="0"/>
-              <a:t>5/19/2022</a:t>
+              <a:t>9/12/2022</a:t>
             </a:fld>
             <a:endParaRPr lang="en-US"/>
           </a:p>
@@ -1613,7 +1613,7 @@
           <a:p>
             <a:fld id="{66C7D333-9F60-49D1-8F75-20D2324FF5CF}" type="datetimeFigureOut">
               <a:rPr lang="en-US" smtClean="0"/>
-              <a:t>5/19/2022</a:t>
+              <a:t>9/12/2022</a:t>
             </a:fld>
             <a:endParaRPr lang="en-US"/>
           </a:p>
@@ -1927,7 +1927,7 @@
           <a:p>
             <a:fld id="{66C7D333-9F60-49D1-8F75-20D2324FF5CF}" type="datetimeFigureOut">
               <a:rPr lang="en-US" smtClean="0"/>
-              <a:t>5/19/2022</a:t>
+              <a:t>9/12/2022</a:t>
             </a:fld>
             <a:endParaRPr lang="en-US"/>
           </a:p>
@@ -2268,7 +2268,7 @@
           <a:p>
             <a:fld id="{66C7D333-9F60-49D1-8F75-20D2324FF5CF}" type="datetimeFigureOut">
               <a:rPr lang="en-US" smtClean="0"/>
-              <a:t>5/19/2022</a:t>
+              <a:t>9/12/2022</a:t>
             </a:fld>
             <a:endParaRPr lang="en-US"/>
           </a:p>
@@ -2582,7 +2582,7 @@
           <a:p>
             <a:fld id="{66C7D333-9F60-49D1-8F75-20D2324FF5CF}" type="datetimeFigureOut">
               <a:rPr lang="en-US" smtClean="0"/>
-              <a:t>5/19/2022</a:t>
+              <a:t>9/12/2022</a:t>
             </a:fld>
             <a:endParaRPr lang="en-US"/>
           </a:p>
@@ -2975,7 +2975,7 @@
           <a:p>
             <a:fld id="{66C7D333-9F60-49D1-8F75-20D2324FF5CF}" type="datetimeFigureOut">
               <a:rPr lang="en-US" smtClean="0"/>
-              <a:t>5/19/2022</a:t>
+              <a:t>9/12/2022</a:t>
             </a:fld>
             <a:endParaRPr lang="en-US"/>
           </a:p>
@@ -3145,7 +3145,7 @@
           <a:p>
             <a:fld id="{66C7D333-9F60-49D1-8F75-20D2324FF5CF}" type="datetimeFigureOut">
               <a:rPr lang="en-US" smtClean="0"/>
-              <a:t>5/19/2022</a:t>
+              <a:t>9/12/2022</a:t>
             </a:fld>
             <a:endParaRPr lang="en-US"/>
           </a:p>
@@ -3325,7 +3325,7 @@
           <a:p>
             <a:fld id="{66C7D333-9F60-49D1-8F75-20D2324FF5CF}" type="datetimeFigureOut">
               <a:rPr lang="en-US" smtClean="0"/>
-              <a:t>5/19/2022</a:t>
+              <a:t>9/12/2022</a:t>
             </a:fld>
             <a:endParaRPr lang="en-US"/>
           </a:p>
@@ -3501,7 +3501,7 @@
           <a:p>
             <a:fld id="{66C7D333-9F60-49D1-8F75-20D2324FF5CF}" type="datetimeFigureOut">
               <a:rPr lang="en-US" smtClean="0"/>
-              <a:t>5/19/2022</a:t>
+              <a:t>9/12/2022</a:t>
             </a:fld>
             <a:endParaRPr lang="en-US"/>
           </a:p>
@@ -3748,7 +3748,7 @@
           <a:p>
             <a:fld id="{66C7D333-9F60-49D1-8F75-20D2324FF5CF}" type="datetimeFigureOut">
               <a:rPr lang="en-US" smtClean="0"/>
-              <a:t>5/19/2022</a:t>
+              <a:t>9/12/2022</a:t>
             </a:fld>
             <a:endParaRPr lang="en-US"/>
           </a:p>
@@ -3980,7 +3980,7 @@
           <a:p>
             <a:fld id="{66C7D333-9F60-49D1-8F75-20D2324FF5CF}" type="datetimeFigureOut">
               <a:rPr lang="en-US" smtClean="0"/>
-              <a:t>5/19/2022</a:t>
+              <a:t>9/12/2022</a:t>
             </a:fld>
             <a:endParaRPr lang="en-US"/>
           </a:p>
@@ -4354,7 +4354,7 @@
           <a:p>
             <a:fld id="{66C7D333-9F60-49D1-8F75-20D2324FF5CF}" type="datetimeFigureOut">
               <a:rPr lang="en-US" smtClean="0"/>
-              <a:t>5/19/2022</a:t>
+              <a:t>9/12/2022</a:t>
             </a:fld>
             <a:endParaRPr lang="en-US"/>
           </a:p>
@@ -4477,7 +4477,7 @@
           <a:p>
             <a:fld id="{66C7D333-9F60-49D1-8F75-20D2324FF5CF}" type="datetimeFigureOut">
               <a:rPr lang="en-US" smtClean="0"/>
-              <a:t>5/19/2022</a:t>
+              <a:t>9/12/2022</a:t>
             </a:fld>
             <a:endParaRPr lang="en-US"/>
           </a:p>
@@ -4572,7 +4572,7 @@
           <a:p>
             <a:fld id="{66C7D333-9F60-49D1-8F75-20D2324FF5CF}" type="datetimeFigureOut">
               <a:rPr lang="en-US" smtClean="0"/>
-              <a:t>5/19/2022</a:t>
+              <a:t>9/12/2022</a:t>
             </a:fld>
             <a:endParaRPr lang="en-US"/>
           </a:p>
@@ -4827,7 +4827,7 @@
           <a:p>
             <a:fld id="{66C7D333-9F60-49D1-8F75-20D2324FF5CF}" type="datetimeFigureOut">
               <a:rPr lang="en-US" smtClean="0"/>
-              <a:t>5/19/2022</a:t>
+              <a:t>9/12/2022</a:t>
             </a:fld>
             <a:endParaRPr lang="en-US"/>
           </a:p>
@@ -5090,7 +5090,7 @@
           <a:p>
             <a:fld id="{66C7D333-9F60-49D1-8F75-20D2324FF5CF}" type="datetimeFigureOut">
               <a:rPr lang="en-US" smtClean="0"/>
-              <a:t>5/19/2022</a:t>
+              <a:t>9/12/2022</a:t>
             </a:fld>
             <a:endParaRPr lang="en-US"/>
           </a:p>
@@ -5833,7 +5833,7 @@
           <a:p>
             <a:fld id="{66C7D333-9F60-49D1-8F75-20D2324FF5CF}" type="datetimeFigureOut">
               <a:rPr lang="en-US" smtClean="0"/>
-              <a:t>5/19/2022</a:t>
+              <a:t>9/12/2022</a:t>
             </a:fld>
             <a:endParaRPr lang="en-US"/>
           </a:p>
@@ -6362,7 +6362,7 @@
           <p:cNvPr id="7" name="Title 1">
             <a:extLst>
               <a:ext uri="{FF2B5EF4-FFF2-40B4-BE49-F238E27FC236}">
-                <a16:creationId xmlns:a16="http://schemas.microsoft.com/office/drawing/2014/main" xmlns="" id="{1C0CCB67-38AA-4A67-8E4C-991AF6AC2FD5}"/>
+                <a16:creationId xmlns="" xmlns:a16="http://schemas.microsoft.com/office/drawing/2014/main" id="{1C0CCB67-38AA-4A67-8E4C-991AF6AC2FD5}"/>
               </a:ext>
             </a:extLst>
           </p:cNvPr>
@@ -6405,7 +6405,7 @@
           <p:cNvPr id="8" name="Subtitle 2">
             <a:extLst>
               <a:ext uri="{FF2B5EF4-FFF2-40B4-BE49-F238E27FC236}">
-                <a16:creationId xmlns:a16="http://schemas.microsoft.com/office/drawing/2014/main" xmlns="" id="{4C524151-E37B-43FF-B793-C9605D52165C}"/>
+                <a16:creationId xmlns="" xmlns:a16="http://schemas.microsoft.com/office/drawing/2014/main" id="{4C524151-E37B-43FF-B793-C9605D52165C}"/>
               </a:ext>
             </a:extLst>
           </p:cNvPr>
@@ -6449,7 +6449,23 @@
             </a:pPr>
             <a:r>
               <a:rPr lang="ru-RU" sz="2800" dirty="0"/>
-              <a:t>Шаблонные классы</a:t>
+              <a:t>Шаблонные </a:t>
+            </a:r>
+            <a:r>
+              <a:rPr lang="ru-RU" sz="2800" dirty="0" smtClean="0"/>
+              <a:t>классы</a:t>
+            </a:r>
+            <a:endParaRPr lang="en-US" sz="2800" dirty="0" smtClean="0"/>
+          </a:p>
+          <a:p>
+            <a:pPr marL="285750" indent="-285750" algn="l">
+              <a:buSzPct val="100000"/>
+              <a:buFont typeface="Arial" panose="020B0604020202020204" pitchFamily="34" charset="0"/>
+              <a:buChar char="•"/>
+            </a:pPr>
+            <a:r>
+              <a:rPr lang="ru-RU" sz="2800" dirty="0" smtClean="0"/>
+              <a:t>Умные указатели</a:t>
             </a:r>
             <a:endParaRPr lang="en-US" sz="2800" dirty="0"/>
           </a:p>
@@ -6490,7 +6506,7 @@
           <p:cNvPr id="3" name="Content Placeholder 2">
             <a:extLst>
               <a:ext uri="{FF2B5EF4-FFF2-40B4-BE49-F238E27FC236}">
-                <a16:creationId xmlns:a16="http://schemas.microsoft.com/office/drawing/2014/main" xmlns="" id="{A4514022-5DBE-451C-8C11-DB261A71424B}"/>
+                <a16:creationId xmlns="" xmlns:a16="http://schemas.microsoft.com/office/drawing/2014/main" id="{A4514022-5DBE-451C-8C11-DB261A71424B}"/>
               </a:ext>
             </a:extLst>
           </p:cNvPr>
@@ -6617,7 +6633,7 @@
           <p:cNvPr id="4" name="Title 1">
             <a:extLst>
               <a:ext uri="{FF2B5EF4-FFF2-40B4-BE49-F238E27FC236}">
-                <a16:creationId xmlns:a16="http://schemas.microsoft.com/office/drawing/2014/main" xmlns="" id="{F0681298-F392-4104-ADA0-945738FC0E4D}"/>
+                <a16:creationId xmlns="" xmlns:a16="http://schemas.microsoft.com/office/drawing/2014/main" id="{F0681298-F392-4104-ADA0-945738FC0E4D}"/>
               </a:ext>
             </a:extLst>
           </p:cNvPr>
@@ -6734,7 +6750,7 @@
           <p:cNvPr id="2" name="Picture 1">
             <a:extLst>
               <a:ext uri="{FF2B5EF4-FFF2-40B4-BE49-F238E27FC236}">
-                <a16:creationId xmlns:a16="http://schemas.microsoft.com/office/drawing/2014/main" xmlns="" id="{5D0704E8-F485-4057-B35A-2F3FF83E1C9A}"/>
+                <a16:creationId xmlns="" xmlns:a16="http://schemas.microsoft.com/office/drawing/2014/main" id="{5D0704E8-F485-4057-B35A-2F3FF83E1C9A}"/>
               </a:ext>
             </a:extLst>
           </p:cNvPr>
@@ -6764,7 +6780,7 @@
           <p:cNvPr id="6" name="Picture 5">
             <a:extLst>
               <a:ext uri="{FF2B5EF4-FFF2-40B4-BE49-F238E27FC236}">
-                <a16:creationId xmlns:a16="http://schemas.microsoft.com/office/drawing/2014/main" xmlns="" id="{15457E4A-55A9-4385-A958-32CB9E3767EE}"/>
+                <a16:creationId xmlns="" xmlns:a16="http://schemas.microsoft.com/office/drawing/2014/main" id="{15457E4A-55A9-4385-A958-32CB9E3767EE}"/>
               </a:ext>
             </a:extLst>
           </p:cNvPr>
@@ -6794,7 +6810,7 @@
           <p:cNvPr id="7" name="TextBox 6">
             <a:extLst>
               <a:ext uri="{FF2B5EF4-FFF2-40B4-BE49-F238E27FC236}">
-                <a16:creationId xmlns:a16="http://schemas.microsoft.com/office/drawing/2014/main" xmlns="" id="{A6BBC628-3282-46EB-AC3A-5EFFD76279FC}"/>
+                <a16:creationId xmlns="" xmlns:a16="http://schemas.microsoft.com/office/drawing/2014/main" id="{A6BBC628-3282-46EB-AC3A-5EFFD76279FC}"/>
               </a:ext>
             </a:extLst>
           </p:cNvPr>
@@ -6830,7 +6846,7 @@
           <p:cNvPr id="8" name="TextBox 7">
             <a:extLst>
               <a:ext uri="{FF2B5EF4-FFF2-40B4-BE49-F238E27FC236}">
-                <a16:creationId xmlns:a16="http://schemas.microsoft.com/office/drawing/2014/main" xmlns="" id="{6D6E23F6-3344-4150-BF6C-451F5F72FE3A}"/>
+                <a16:creationId xmlns="" xmlns:a16="http://schemas.microsoft.com/office/drawing/2014/main" id="{6D6E23F6-3344-4150-BF6C-451F5F72FE3A}"/>
               </a:ext>
             </a:extLst>
           </p:cNvPr>
@@ -6896,7 +6912,7 @@
           <p:cNvPr id="3" name="Content Placeholder 2">
             <a:extLst>
               <a:ext uri="{FF2B5EF4-FFF2-40B4-BE49-F238E27FC236}">
-                <a16:creationId xmlns:a16="http://schemas.microsoft.com/office/drawing/2014/main" xmlns="" id="{8739A000-E665-4F3A-AEFA-47CE06716357}"/>
+                <a16:creationId xmlns="" xmlns:a16="http://schemas.microsoft.com/office/drawing/2014/main" id="{8739A000-E665-4F3A-AEFA-47CE06716357}"/>
               </a:ext>
             </a:extLst>
           </p:cNvPr>
@@ -6976,7 +6992,7 @@
           <p:cNvPr id="4" name="Title 1">
             <a:extLst>
               <a:ext uri="{FF2B5EF4-FFF2-40B4-BE49-F238E27FC236}">
-                <a16:creationId xmlns:a16="http://schemas.microsoft.com/office/drawing/2014/main" xmlns="" id="{1D766801-EDE4-4361-933A-A5167ACE2754}"/>
+                <a16:creationId xmlns="" xmlns:a16="http://schemas.microsoft.com/office/drawing/2014/main" id="{1D766801-EDE4-4361-933A-A5167ACE2754}"/>
               </a:ext>
             </a:extLst>
           </p:cNvPr>
@@ -7093,7 +7109,7 @@
           <p:cNvPr id="8" name="TextBox 7">
             <a:extLst>
               <a:ext uri="{FF2B5EF4-FFF2-40B4-BE49-F238E27FC236}">
-                <a16:creationId xmlns:a16="http://schemas.microsoft.com/office/drawing/2014/main" xmlns="" id="{0C4CD969-9B83-41AE-9597-4C2562AF37F2}"/>
+                <a16:creationId xmlns="" xmlns:a16="http://schemas.microsoft.com/office/drawing/2014/main" id="{0C4CD969-9B83-41AE-9597-4C2562AF37F2}"/>
               </a:ext>
             </a:extLst>
           </p:cNvPr>
@@ -7151,7 +7167,7 @@
           <p:cNvPr id="6" name="Content Placeholder 2">
             <a:extLst>
               <a:ext uri="{FF2B5EF4-FFF2-40B4-BE49-F238E27FC236}">
-                <a16:creationId xmlns:a16="http://schemas.microsoft.com/office/drawing/2014/main" xmlns="" id="{8739A000-E665-4F3A-AEFA-47CE06716357}"/>
+                <a16:creationId xmlns="" xmlns:a16="http://schemas.microsoft.com/office/drawing/2014/main" id="{8739A000-E665-4F3A-AEFA-47CE06716357}"/>
               </a:ext>
             </a:extLst>
           </p:cNvPr>
@@ -7448,7 +7464,7 @@
           <p:cNvPr id="4" name="Content Placeholder 2">
             <a:extLst>
               <a:ext uri="{FF2B5EF4-FFF2-40B4-BE49-F238E27FC236}">
-                <a16:creationId xmlns:a16="http://schemas.microsoft.com/office/drawing/2014/main" xmlns="" id="{9384FCA6-BF36-46C7-BB6D-FB71B0BC0D62}"/>
+                <a16:creationId xmlns="" xmlns:a16="http://schemas.microsoft.com/office/drawing/2014/main" id="{9384FCA6-BF36-46C7-BB6D-FB71B0BC0D62}"/>
               </a:ext>
             </a:extLst>
           </p:cNvPr>
@@ -7806,7 +7822,7 @@
           <p:cNvPr id="5" name="Title 1">
             <a:extLst>
               <a:ext uri="{FF2B5EF4-FFF2-40B4-BE49-F238E27FC236}">
-                <a16:creationId xmlns:a16="http://schemas.microsoft.com/office/drawing/2014/main" xmlns="" id="{3B6EE643-EB48-4F06-ABE3-B6EFDA9EE4C6}"/>
+                <a16:creationId xmlns="" xmlns:a16="http://schemas.microsoft.com/office/drawing/2014/main" id="{3B6EE643-EB48-4F06-ABE3-B6EFDA9EE4C6}"/>
               </a:ext>
             </a:extLst>
           </p:cNvPr>
@@ -7953,7 +7969,7 @@
           <p:cNvPr id="3" name="Content Placeholder 2">
             <a:extLst>
               <a:ext uri="{FF2B5EF4-FFF2-40B4-BE49-F238E27FC236}">
-                <a16:creationId xmlns:a16="http://schemas.microsoft.com/office/drawing/2014/main" xmlns="" id="{7A7EEC47-6C8A-4849-A5C1-1A755BB1397E}"/>
+                <a16:creationId xmlns="" xmlns:a16="http://schemas.microsoft.com/office/drawing/2014/main" id="{7A7EEC47-6C8A-4849-A5C1-1A755BB1397E}"/>
               </a:ext>
             </a:extLst>
           </p:cNvPr>
@@ -8000,7 +8016,7 @@
           <p:cNvPr id="4" name="Title 1">
             <a:extLst>
               <a:ext uri="{FF2B5EF4-FFF2-40B4-BE49-F238E27FC236}">
-                <a16:creationId xmlns:a16="http://schemas.microsoft.com/office/drawing/2014/main" xmlns="" id="{3DF7057A-7FD2-408C-B1B8-4A9BEB04C2A9}"/>
+                <a16:creationId xmlns="" xmlns:a16="http://schemas.microsoft.com/office/drawing/2014/main" id="{3DF7057A-7FD2-408C-B1B8-4A9BEB04C2A9}"/>
               </a:ext>
             </a:extLst>
           </p:cNvPr>
@@ -8117,7 +8133,7 @@
           <p:cNvPr id="5" name="Picture 4">
             <a:extLst>
               <a:ext uri="{FF2B5EF4-FFF2-40B4-BE49-F238E27FC236}">
-                <a16:creationId xmlns:a16="http://schemas.microsoft.com/office/drawing/2014/main" xmlns="" id="{EEB5D373-8DBF-4C03-A2E1-216E792AE73E}"/>
+                <a16:creationId xmlns="" xmlns:a16="http://schemas.microsoft.com/office/drawing/2014/main" id="{EEB5D373-8DBF-4C03-A2E1-216E792AE73E}"/>
               </a:ext>
             </a:extLst>
           </p:cNvPr>
@@ -8147,7 +8163,7 @@
           <p:cNvPr id="6" name="Picture 5">
             <a:extLst>
               <a:ext uri="{FF2B5EF4-FFF2-40B4-BE49-F238E27FC236}">
-                <a16:creationId xmlns:a16="http://schemas.microsoft.com/office/drawing/2014/main" xmlns="" id="{D2F09261-7098-4D5A-9F1F-9F3F4C86DAF7}"/>
+                <a16:creationId xmlns="" xmlns:a16="http://schemas.microsoft.com/office/drawing/2014/main" id="{D2F09261-7098-4D5A-9F1F-9F3F4C86DAF7}"/>
               </a:ext>
             </a:extLst>
           </p:cNvPr>
@@ -8177,7 +8193,7 @@
           <p:cNvPr id="7" name="TextBox 6">
             <a:extLst>
               <a:ext uri="{FF2B5EF4-FFF2-40B4-BE49-F238E27FC236}">
-                <a16:creationId xmlns:a16="http://schemas.microsoft.com/office/drawing/2014/main" xmlns="" id="{4047C987-1A4D-4611-9A48-6B20D64A859C}"/>
+                <a16:creationId xmlns="" xmlns:a16="http://schemas.microsoft.com/office/drawing/2014/main" id="{4047C987-1A4D-4611-9A48-6B20D64A859C}"/>
               </a:ext>
             </a:extLst>
           </p:cNvPr>
@@ -8216,7 +8232,7 @@
           <p:cNvPr id="9" name="TextBox 8">
             <a:extLst>
               <a:ext uri="{FF2B5EF4-FFF2-40B4-BE49-F238E27FC236}">
-                <a16:creationId xmlns:a16="http://schemas.microsoft.com/office/drawing/2014/main" xmlns="" id="{847CAB48-C0D6-453B-92CE-9C78DD3FBBC2}"/>
+                <a16:creationId xmlns="" xmlns:a16="http://schemas.microsoft.com/office/drawing/2014/main" id="{847CAB48-C0D6-453B-92CE-9C78DD3FBBC2}"/>
               </a:ext>
             </a:extLst>
           </p:cNvPr>
@@ -8252,7 +8268,7 @@
           <p:cNvPr id="10" name="Content Placeholder 2">
             <a:extLst>
               <a:ext uri="{FF2B5EF4-FFF2-40B4-BE49-F238E27FC236}">
-                <a16:creationId xmlns:a16="http://schemas.microsoft.com/office/drawing/2014/main" xmlns="" id="{DA3881EB-C936-4EBB-83A7-94F7BAB1D140}"/>
+                <a16:creationId xmlns="" xmlns:a16="http://schemas.microsoft.com/office/drawing/2014/main" id="{DA3881EB-C936-4EBB-83A7-94F7BAB1D140}"/>
               </a:ext>
             </a:extLst>
           </p:cNvPr>
@@ -8715,7 +8731,7 @@
           <p:cNvPr id="5" name="Title 1">
             <a:extLst>
               <a:ext uri="{FF2B5EF4-FFF2-40B4-BE49-F238E27FC236}">
-                <a16:creationId xmlns:a16="http://schemas.microsoft.com/office/drawing/2014/main" xmlns="" id="{3DF7057A-7FD2-408C-B1B8-4A9BEB04C2A9}"/>
+                <a16:creationId xmlns="" xmlns:a16="http://schemas.microsoft.com/office/drawing/2014/main" id="{3DF7057A-7FD2-408C-B1B8-4A9BEB04C2A9}"/>
               </a:ext>
             </a:extLst>
           </p:cNvPr>
@@ -9355,7 +9371,7 @@
           <p:cNvPr id="4" name="Title 1">
             <a:extLst>
               <a:ext uri="{FF2B5EF4-FFF2-40B4-BE49-F238E27FC236}">
-                <a16:creationId xmlns:a16="http://schemas.microsoft.com/office/drawing/2014/main" xmlns="" id="{3DF7057A-7FD2-408C-B1B8-4A9BEB04C2A9}"/>
+                <a16:creationId xmlns="" xmlns:a16="http://schemas.microsoft.com/office/drawing/2014/main" id="{3DF7057A-7FD2-408C-B1B8-4A9BEB04C2A9}"/>
               </a:ext>
             </a:extLst>
           </p:cNvPr>
@@ -11092,11 +11108,11 @@
   <p:clrMapOvr>
     <a:masterClrMapping/>
   </p:clrMapOvr>
-  <mc:AlternateContent xmlns:mc="http://schemas.openxmlformats.org/markup-compatibility/2006">
-    <mc:Choice xmlns:p14="http://schemas.microsoft.com/office/powerpoint/2010/main" Requires="p14">
+  <mc:AlternateContent xmlns:mc="http://schemas.openxmlformats.org/markup-compatibility/2006" xmlns:p14="http://schemas.microsoft.com/office/powerpoint/2010/main">
+    <mc:Choice Requires="p14">
       <p:transition spd="slow" p14:dur="2000"/>
     </mc:Choice>
-    <mc:Fallback>
+    <mc:Fallback xmlns="">
       <p:transition spd="slow"/>
     </mc:Fallback>
   </mc:AlternateContent>
@@ -12124,11 +12140,11 @@
   <p:clrMapOvr>
     <a:masterClrMapping/>
   </p:clrMapOvr>
-  <mc:AlternateContent xmlns:mc="http://schemas.openxmlformats.org/markup-compatibility/2006">
-    <mc:Choice xmlns:p14="http://schemas.microsoft.com/office/powerpoint/2010/main" Requires="p14">
+  <mc:AlternateContent xmlns:mc="http://schemas.openxmlformats.org/markup-compatibility/2006" xmlns:p14="http://schemas.microsoft.com/office/powerpoint/2010/main">
+    <mc:Choice Requires="p14">
       <p:transition spd="slow" p14:dur="2000"/>
     </mc:Choice>
-    <mc:Fallback>
+    <mc:Fallback xmlns="">
       <p:transition spd="slow"/>
     </mc:Fallback>
   </mc:AlternateContent>

</xml_diff>